<commit_message>
Omarbeidet og utvidet fagtekst, forenklet kode, lagt til oppgave
</commit_message>
<xml_diff>
--- a/Fagstoff/img_src/tankmodeller.pptx
+++ b/Fagstoff/img_src/tankmodeller.pptx
@@ -9,6 +9,7 @@
     <p:sldId id="259" r:id="rId3"/>
     <p:sldId id="257" r:id="rId4"/>
     <p:sldId id="258" r:id="rId5"/>
+    <p:sldId id="260" r:id="rId6"/>
   </p:sldIdLst>
   <p:sldSz cx="12192000" cy="6858000"/>
   <p:notesSz cx="6858000" cy="9144000"/>
@@ -157,10 +158,9 @@
           </a:lstStyle>
           <a:p>
             <a:r>
-              <a:rPr lang="nb-NO" smtClean="0"/>
+              <a:rPr lang="nb-NO"/>
               <a:t>Klikk for å redigere tittelstil</a:t>
             </a:r>
-            <a:endParaRPr lang="nb-NO"/>
           </a:p>
         </p:txBody>
       </p:sp>
@@ -222,10 +222,9 @@
           </a:lstStyle>
           <a:p>
             <a:r>
-              <a:rPr lang="nb-NO" smtClean="0"/>
+              <a:rPr lang="nb-NO"/>
               <a:t>Klikk for å redigere undertittelstil i malen</a:t>
             </a:r>
-            <a:endParaRPr lang="nb-NO"/>
           </a:p>
         </p:txBody>
       </p:sp>
@@ -246,7 +245,7 @@
           <a:p>
             <a:fld id="{68AFD362-A73F-9342-8E25-D2CF56234776}" type="datetimeFigureOut">
               <a:rPr lang="nb-NO" smtClean="0"/>
-              <a:t>30.06.2017</a:t>
+              <a:t>30.01.2018</a:t>
             </a:fld>
             <a:endParaRPr lang="nb-NO"/>
           </a:p>
@@ -340,10 +339,9 @@
           <a:lstStyle/>
           <a:p>
             <a:r>
-              <a:rPr lang="nb-NO" smtClean="0"/>
+              <a:rPr lang="nb-NO"/>
               <a:t>Klikk for å redigere tittelstil</a:t>
             </a:r>
-            <a:endParaRPr lang="nb-NO"/>
           </a:p>
         </p:txBody>
       </p:sp>
@@ -364,38 +362,37 @@
           <a:p>
             <a:pPr lvl="0"/>
             <a:r>
-              <a:rPr lang="nb-NO" smtClean="0"/>
+              <a:rPr lang="nb-NO"/>
               <a:t>Klikk for å redigere tekststiler i malen</a:t>
             </a:r>
           </a:p>
           <a:p>
             <a:pPr lvl="1"/>
             <a:r>
-              <a:rPr lang="nb-NO" smtClean="0"/>
+              <a:rPr lang="nb-NO"/>
               <a:t>Andre nivå</a:t>
             </a:r>
           </a:p>
           <a:p>
             <a:pPr lvl="2"/>
             <a:r>
-              <a:rPr lang="nb-NO" smtClean="0"/>
+              <a:rPr lang="nb-NO"/>
               <a:t>Tredje nivå</a:t>
             </a:r>
           </a:p>
           <a:p>
             <a:pPr lvl="3"/>
             <a:r>
-              <a:rPr lang="nb-NO" smtClean="0"/>
+              <a:rPr lang="nb-NO"/>
               <a:t>Fjerde nivå</a:t>
             </a:r>
           </a:p>
           <a:p>
             <a:pPr lvl="4"/>
             <a:r>
-              <a:rPr lang="nb-NO" smtClean="0"/>
+              <a:rPr lang="nb-NO"/>
               <a:t>Femte nivå</a:t>
             </a:r>
-            <a:endParaRPr lang="nb-NO"/>
           </a:p>
         </p:txBody>
       </p:sp>
@@ -416,7 +413,7 @@
           <a:p>
             <a:fld id="{68AFD362-A73F-9342-8E25-D2CF56234776}" type="datetimeFigureOut">
               <a:rPr lang="nb-NO" smtClean="0"/>
-              <a:t>30.06.2017</a:t>
+              <a:t>30.01.2018</a:t>
             </a:fld>
             <a:endParaRPr lang="nb-NO"/>
           </a:p>
@@ -515,10 +512,9 @@
           <a:lstStyle/>
           <a:p>
             <a:r>
-              <a:rPr lang="nb-NO" smtClean="0"/>
+              <a:rPr lang="nb-NO"/>
               <a:t>Klikk for å redigere tittelstil</a:t>
             </a:r>
-            <a:endParaRPr lang="nb-NO"/>
           </a:p>
         </p:txBody>
       </p:sp>
@@ -544,38 +540,37 @@
           <a:p>
             <a:pPr lvl="0"/>
             <a:r>
-              <a:rPr lang="nb-NO" smtClean="0"/>
+              <a:rPr lang="nb-NO"/>
               <a:t>Klikk for å redigere tekststiler i malen</a:t>
             </a:r>
           </a:p>
           <a:p>
             <a:pPr lvl="1"/>
             <a:r>
-              <a:rPr lang="nb-NO" smtClean="0"/>
+              <a:rPr lang="nb-NO"/>
               <a:t>Andre nivå</a:t>
             </a:r>
           </a:p>
           <a:p>
             <a:pPr lvl="2"/>
             <a:r>
-              <a:rPr lang="nb-NO" smtClean="0"/>
+              <a:rPr lang="nb-NO"/>
               <a:t>Tredje nivå</a:t>
             </a:r>
           </a:p>
           <a:p>
             <a:pPr lvl="3"/>
             <a:r>
-              <a:rPr lang="nb-NO" smtClean="0"/>
+              <a:rPr lang="nb-NO"/>
               <a:t>Fjerde nivå</a:t>
             </a:r>
           </a:p>
           <a:p>
             <a:pPr lvl="4"/>
             <a:r>
-              <a:rPr lang="nb-NO" smtClean="0"/>
+              <a:rPr lang="nb-NO"/>
               <a:t>Femte nivå</a:t>
             </a:r>
-            <a:endParaRPr lang="nb-NO"/>
           </a:p>
         </p:txBody>
       </p:sp>
@@ -596,7 +591,7 @@
           <a:p>
             <a:fld id="{68AFD362-A73F-9342-8E25-D2CF56234776}" type="datetimeFigureOut">
               <a:rPr lang="nb-NO" smtClean="0"/>
-              <a:t>30.06.2017</a:t>
+              <a:t>30.01.2018</a:t>
             </a:fld>
             <a:endParaRPr lang="nb-NO"/>
           </a:p>
@@ -690,10 +685,9 @@
           <a:lstStyle/>
           <a:p>
             <a:r>
-              <a:rPr lang="nb-NO" smtClean="0"/>
+              <a:rPr lang="nb-NO"/>
               <a:t>Klikk for å redigere tittelstil</a:t>
             </a:r>
-            <a:endParaRPr lang="nb-NO"/>
           </a:p>
         </p:txBody>
       </p:sp>
@@ -714,38 +708,37 @@
           <a:p>
             <a:pPr lvl="0"/>
             <a:r>
-              <a:rPr lang="nb-NO" smtClean="0"/>
+              <a:rPr lang="nb-NO"/>
               <a:t>Klikk for å redigere tekststiler i malen</a:t>
             </a:r>
           </a:p>
           <a:p>
             <a:pPr lvl="1"/>
             <a:r>
-              <a:rPr lang="nb-NO" smtClean="0"/>
+              <a:rPr lang="nb-NO"/>
               <a:t>Andre nivå</a:t>
             </a:r>
           </a:p>
           <a:p>
             <a:pPr lvl="2"/>
             <a:r>
-              <a:rPr lang="nb-NO" smtClean="0"/>
+              <a:rPr lang="nb-NO"/>
               <a:t>Tredje nivå</a:t>
             </a:r>
           </a:p>
           <a:p>
             <a:pPr lvl="3"/>
             <a:r>
-              <a:rPr lang="nb-NO" smtClean="0"/>
+              <a:rPr lang="nb-NO"/>
               <a:t>Fjerde nivå</a:t>
             </a:r>
           </a:p>
           <a:p>
             <a:pPr lvl="4"/>
             <a:r>
-              <a:rPr lang="nb-NO" smtClean="0"/>
+              <a:rPr lang="nb-NO"/>
               <a:t>Femte nivå</a:t>
             </a:r>
-            <a:endParaRPr lang="nb-NO"/>
           </a:p>
         </p:txBody>
       </p:sp>
@@ -766,7 +759,7 @@
           <a:p>
             <a:fld id="{68AFD362-A73F-9342-8E25-D2CF56234776}" type="datetimeFigureOut">
               <a:rPr lang="nb-NO" smtClean="0"/>
-              <a:t>30.06.2017</a:t>
+              <a:t>30.01.2018</a:t>
             </a:fld>
             <a:endParaRPr lang="nb-NO"/>
           </a:p>
@@ -869,10 +862,9 @@
           </a:lstStyle>
           <a:p>
             <a:r>
-              <a:rPr lang="nb-NO" smtClean="0"/>
+              <a:rPr lang="nb-NO"/>
               <a:t>Klikk for å redigere tittelstil</a:t>
             </a:r>
-            <a:endParaRPr lang="nb-NO"/>
           </a:p>
         </p:txBody>
       </p:sp>
@@ -989,7 +981,7 @@
           <a:p>
             <a:pPr lvl="0"/>
             <a:r>
-              <a:rPr lang="nb-NO" smtClean="0"/>
+              <a:rPr lang="nb-NO"/>
               <a:t>Klikk for å redigere tekststiler i malen</a:t>
             </a:r>
           </a:p>
@@ -1012,7 +1004,7 @@
           <a:p>
             <a:fld id="{68AFD362-A73F-9342-8E25-D2CF56234776}" type="datetimeFigureOut">
               <a:rPr lang="nb-NO" smtClean="0"/>
-              <a:t>30.06.2017</a:t>
+              <a:t>30.01.2018</a:t>
             </a:fld>
             <a:endParaRPr lang="nb-NO"/>
           </a:p>
@@ -1106,10 +1098,9 @@
           <a:lstStyle/>
           <a:p>
             <a:r>
-              <a:rPr lang="nb-NO" smtClean="0"/>
+              <a:rPr lang="nb-NO"/>
               <a:t>Klikk for å redigere tittelstil</a:t>
             </a:r>
-            <a:endParaRPr lang="nb-NO"/>
           </a:p>
         </p:txBody>
       </p:sp>
@@ -1135,38 +1126,37 @@
           <a:p>
             <a:pPr lvl="0"/>
             <a:r>
-              <a:rPr lang="nb-NO" smtClean="0"/>
+              <a:rPr lang="nb-NO"/>
               <a:t>Klikk for å redigere tekststiler i malen</a:t>
             </a:r>
           </a:p>
           <a:p>
             <a:pPr lvl="1"/>
             <a:r>
-              <a:rPr lang="nb-NO" smtClean="0"/>
+              <a:rPr lang="nb-NO"/>
               <a:t>Andre nivå</a:t>
             </a:r>
           </a:p>
           <a:p>
             <a:pPr lvl="2"/>
             <a:r>
-              <a:rPr lang="nb-NO" smtClean="0"/>
+              <a:rPr lang="nb-NO"/>
               <a:t>Tredje nivå</a:t>
             </a:r>
           </a:p>
           <a:p>
             <a:pPr lvl="3"/>
             <a:r>
-              <a:rPr lang="nb-NO" smtClean="0"/>
+              <a:rPr lang="nb-NO"/>
               <a:t>Fjerde nivå</a:t>
             </a:r>
           </a:p>
           <a:p>
             <a:pPr lvl="4"/>
             <a:r>
-              <a:rPr lang="nb-NO" smtClean="0"/>
+              <a:rPr lang="nb-NO"/>
               <a:t>Femte nivå</a:t>
             </a:r>
-            <a:endParaRPr lang="nb-NO"/>
           </a:p>
         </p:txBody>
       </p:sp>
@@ -1192,38 +1182,37 @@
           <a:p>
             <a:pPr lvl="0"/>
             <a:r>
-              <a:rPr lang="nb-NO" smtClean="0"/>
+              <a:rPr lang="nb-NO"/>
               <a:t>Klikk for å redigere tekststiler i malen</a:t>
             </a:r>
           </a:p>
           <a:p>
             <a:pPr lvl="1"/>
             <a:r>
-              <a:rPr lang="nb-NO" smtClean="0"/>
+              <a:rPr lang="nb-NO"/>
               <a:t>Andre nivå</a:t>
             </a:r>
           </a:p>
           <a:p>
             <a:pPr lvl="2"/>
             <a:r>
-              <a:rPr lang="nb-NO" smtClean="0"/>
+              <a:rPr lang="nb-NO"/>
               <a:t>Tredje nivå</a:t>
             </a:r>
           </a:p>
           <a:p>
             <a:pPr lvl="3"/>
             <a:r>
-              <a:rPr lang="nb-NO" smtClean="0"/>
+              <a:rPr lang="nb-NO"/>
               <a:t>Fjerde nivå</a:t>
             </a:r>
           </a:p>
           <a:p>
             <a:pPr lvl="4"/>
             <a:r>
-              <a:rPr lang="nb-NO" smtClean="0"/>
+              <a:rPr lang="nb-NO"/>
               <a:t>Femte nivå</a:t>
             </a:r>
-            <a:endParaRPr lang="nb-NO"/>
           </a:p>
         </p:txBody>
       </p:sp>
@@ -1244,7 +1233,7 @@
           <a:p>
             <a:fld id="{68AFD362-A73F-9342-8E25-D2CF56234776}" type="datetimeFigureOut">
               <a:rPr lang="nb-NO" smtClean="0"/>
-              <a:t>30.06.2017</a:t>
+              <a:t>30.01.2018</a:t>
             </a:fld>
             <a:endParaRPr lang="nb-NO"/>
           </a:p>
@@ -1343,10 +1332,9 @@
           <a:lstStyle/>
           <a:p>
             <a:r>
-              <a:rPr lang="nb-NO" smtClean="0"/>
+              <a:rPr lang="nb-NO"/>
               <a:t>Klikk for å redigere tittelstil</a:t>
             </a:r>
-            <a:endParaRPr lang="nb-NO"/>
           </a:p>
         </p:txBody>
       </p:sp>
@@ -1409,7 +1397,7 @@
           <a:p>
             <a:pPr lvl="0"/>
             <a:r>
-              <a:rPr lang="nb-NO" smtClean="0"/>
+              <a:rPr lang="nb-NO"/>
               <a:t>Klikk for å redigere tekststiler i malen</a:t>
             </a:r>
           </a:p>
@@ -1437,38 +1425,37 @@
           <a:p>
             <a:pPr lvl="0"/>
             <a:r>
-              <a:rPr lang="nb-NO" smtClean="0"/>
+              <a:rPr lang="nb-NO"/>
               <a:t>Klikk for å redigere tekststiler i malen</a:t>
             </a:r>
           </a:p>
           <a:p>
             <a:pPr lvl="1"/>
             <a:r>
-              <a:rPr lang="nb-NO" smtClean="0"/>
+              <a:rPr lang="nb-NO"/>
               <a:t>Andre nivå</a:t>
             </a:r>
           </a:p>
           <a:p>
             <a:pPr lvl="2"/>
             <a:r>
-              <a:rPr lang="nb-NO" smtClean="0"/>
+              <a:rPr lang="nb-NO"/>
               <a:t>Tredje nivå</a:t>
             </a:r>
           </a:p>
           <a:p>
             <a:pPr lvl="3"/>
             <a:r>
-              <a:rPr lang="nb-NO" smtClean="0"/>
+              <a:rPr lang="nb-NO"/>
               <a:t>Fjerde nivå</a:t>
             </a:r>
           </a:p>
           <a:p>
             <a:pPr lvl="4"/>
             <a:r>
-              <a:rPr lang="nb-NO" smtClean="0"/>
+              <a:rPr lang="nb-NO"/>
               <a:t>Femte nivå</a:t>
             </a:r>
-            <a:endParaRPr lang="nb-NO"/>
           </a:p>
         </p:txBody>
       </p:sp>
@@ -1531,7 +1518,7 @@
           <a:p>
             <a:pPr lvl="0"/>
             <a:r>
-              <a:rPr lang="nb-NO" smtClean="0"/>
+              <a:rPr lang="nb-NO"/>
               <a:t>Klikk for å redigere tekststiler i malen</a:t>
             </a:r>
           </a:p>
@@ -1559,38 +1546,37 @@
           <a:p>
             <a:pPr lvl="0"/>
             <a:r>
-              <a:rPr lang="nb-NO" smtClean="0"/>
+              <a:rPr lang="nb-NO"/>
               <a:t>Klikk for å redigere tekststiler i malen</a:t>
             </a:r>
           </a:p>
           <a:p>
             <a:pPr lvl="1"/>
             <a:r>
-              <a:rPr lang="nb-NO" smtClean="0"/>
+              <a:rPr lang="nb-NO"/>
               <a:t>Andre nivå</a:t>
             </a:r>
           </a:p>
           <a:p>
             <a:pPr lvl="2"/>
             <a:r>
-              <a:rPr lang="nb-NO" smtClean="0"/>
+              <a:rPr lang="nb-NO"/>
               <a:t>Tredje nivå</a:t>
             </a:r>
           </a:p>
           <a:p>
             <a:pPr lvl="3"/>
             <a:r>
-              <a:rPr lang="nb-NO" smtClean="0"/>
+              <a:rPr lang="nb-NO"/>
               <a:t>Fjerde nivå</a:t>
             </a:r>
           </a:p>
           <a:p>
             <a:pPr lvl="4"/>
             <a:r>
-              <a:rPr lang="nb-NO" smtClean="0"/>
+              <a:rPr lang="nb-NO"/>
               <a:t>Femte nivå</a:t>
             </a:r>
-            <a:endParaRPr lang="nb-NO"/>
           </a:p>
         </p:txBody>
       </p:sp>
@@ -1611,7 +1597,7 @@
           <a:p>
             <a:fld id="{68AFD362-A73F-9342-8E25-D2CF56234776}" type="datetimeFigureOut">
               <a:rPr lang="nb-NO" smtClean="0"/>
-              <a:t>30.06.2017</a:t>
+              <a:t>30.01.2018</a:t>
             </a:fld>
             <a:endParaRPr lang="nb-NO"/>
           </a:p>
@@ -1705,10 +1691,9 @@
           <a:lstStyle/>
           <a:p>
             <a:r>
-              <a:rPr lang="nb-NO" smtClean="0"/>
+              <a:rPr lang="nb-NO"/>
               <a:t>Klikk for å redigere tittelstil</a:t>
             </a:r>
-            <a:endParaRPr lang="nb-NO"/>
           </a:p>
         </p:txBody>
       </p:sp>
@@ -1729,7 +1714,7 @@
           <a:p>
             <a:fld id="{68AFD362-A73F-9342-8E25-D2CF56234776}" type="datetimeFigureOut">
               <a:rPr lang="nb-NO" smtClean="0"/>
-              <a:t>30.06.2017</a:t>
+              <a:t>30.01.2018</a:t>
             </a:fld>
             <a:endParaRPr lang="nb-NO"/>
           </a:p>
@@ -1824,7 +1809,7 @@
           <a:p>
             <a:fld id="{68AFD362-A73F-9342-8E25-D2CF56234776}" type="datetimeFigureOut">
               <a:rPr lang="nb-NO" smtClean="0"/>
-              <a:t>30.06.2017</a:t>
+              <a:t>30.01.2018</a:t>
             </a:fld>
             <a:endParaRPr lang="nb-NO"/>
           </a:p>
@@ -1927,10 +1912,9 @@
           </a:lstStyle>
           <a:p>
             <a:r>
-              <a:rPr lang="nb-NO" smtClean="0"/>
+              <a:rPr lang="nb-NO"/>
               <a:t>Klikk for å redigere tittelstil</a:t>
             </a:r>
-            <a:endParaRPr lang="nb-NO"/>
           </a:p>
         </p:txBody>
       </p:sp>
@@ -1984,38 +1968,37 @@
           <a:p>
             <a:pPr lvl="0"/>
             <a:r>
-              <a:rPr lang="nb-NO" smtClean="0"/>
+              <a:rPr lang="nb-NO"/>
               <a:t>Klikk for å redigere tekststiler i malen</a:t>
             </a:r>
           </a:p>
           <a:p>
             <a:pPr lvl="1"/>
             <a:r>
-              <a:rPr lang="nb-NO" smtClean="0"/>
+              <a:rPr lang="nb-NO"/>
               <a:t>Andre nivå</a:t>
             </a:r>
           </a:p>
           <a:p>
             <a:pPr lvl="2"/>
             <a:r>
-              <a:rPr lang="nb-NO" smtClean="0"/>
+              <a:rPr lang="nb-NO"/>
               <a:t>Tredje nivå</a:t>
             </a:r>
           </a:p>
           <a:p>
             <a:pPr lvl="3"/>
             <a:r>
-              <a:rPr lang="nb-NO" smtClean="0"/>
+              <a:rPr lang="nb-NO"/>
               <a:t>Fjerde nivå</a:t>
             </a:r>
           </a:p>
           <a:p>
             <a:pPr lvl="4"/>
             <a:r>
-              <a:rPr lang="nb-NO" smtClean="0"/>
+              <a:rPr lang="nb-NO"/>
               <a:t>Femte nivå</a:t>
             </a:r>
-            <a:endParaRPr lang="nb-NO"/>
           </a:p>
         </p:txBody>
       </p:sp>
@@ -2078,7 +2061,7 @@
           <a:p>
             <a:pPr lvl="0"/>
             <a:r>
-              <a:rPr lang="nb-NO" smtClean="0"/>
+              <a:rPr lang="nb-NO"/>
               <a:t>Klikk for å redigere tekststiler i malen</a:t>
             </a:r>
           </a:p>
@@ -2101,7 +2084,7 @@
           <a:p>
             <a:fld id="{68AFD362-A73F-9342-8E25-D2CF56234776}" type="datetimeFigureOut">
               <a:rPr lang="nb-NO" smtClean="0"/>
-              <a:t>30.06.2017</a:t>
+              <a:t>30.01.2018</a:t>
             </a:fld>
             <a:endParaRPr lang="nb-NO"/>
           </a:p>
@@ -2204,10 +2187,9 @@
           </a:lstStyle>
           <a:p>
             <a:r>
-              <a:rPr lang="nb-NO" smtClean="0"/>
+              <a:rPr lang="nb-NO"/>
               <a:t>Klikk for å redigere tittelstil</a:t>
             </a:r>
-            <a:endParaRPr lang="nb-NO"/>
           </a:p>
         </p:txBody>
       </p:sp>
@@ -2331,7 +2313,7 @@
           <a:p>
             <a:pPr lvl="0"/>
             <a:r>
-              <a:rPr lang="nb-NO" smtClean="0"/>
+              <a:rPr lang="nb-NO"/>
               <a:t>Klikk for å redigere tekststiler i malen</a:t>
             </a:r>
           </a:p>
@@ -2354,7 +2336,7 @@
           <a:p>
             <a:fld id="{68AFD362-A73F-9342-8E25-D2CF56234776}" type="datetimeFigureOut">
               <a:rPr lang="nb-NO" smtClean="0"/>
-              <a:t>30.06.2017</a:t>
+              <a:t>30.01.2018</a:t>
             </a:fld>
             <a:endParaRPr lang="nb-NO"/>
           </a:p>
@@ -2463,10 +2445,9 @@
           <a:lstStyle/>
           <a:p>
             <a:r>
-              <a:rPr lang="nb-NO" smtClean="0"/>
+              <a:rPr lang="nb-NO"/>
               <a:t>Klikk for å redigere tittelstil</a:t>
             </a:r>
-            <a:endParaRPr lang="nb-NO"/>
           </a:p>
         </p:txBody>
       </p:sp>
@@ -2497,38 +2478,37 @@
           <a:p>
             <a:pPr lvl="0"/>
             <a:r>
-              <a:rPr lang="nb-NO" smtClean="0"/>
+              <a:rPr lang="nb-NO"/>
               <a:t>Klikk for å redigere tekststiler i malen</a:t>
             </a:r>
           </a:p>
           <a:p>
             <a:pPr lvl="1"/>
             <a:r>
-              <a:rPr lang="nb-NO" smtClean="0"/>
+              <a:rPr lang="nb-NO"/>
               <a:t>Andre nivå</a:t>
             </a:r>
           </a:p>
           <a:p>
             <a:pPr lvl="2"/>
             <a:r>
-              <a:rPr lang="nb-NO" smtClean="0"/>
+              <a:rPr lang="nb-NO"/>
               <a:t>Tredje nivå</a:t>
             </a:r>
           </a:p>
           <a:p>
             <a:pPr lvl="3"/>
             <a:r>
-              <a:rPr lang="nb-NO" smtClean="0"/>
+              <a:rPr lang="nb-NO"/>
               <a:t>Fjerde nivå</a:t>
             </a:r>
           </a:p>
           <a:p>
             <a:pPr lvl="4"/>
             <a:r>
-              <a:rPr lang="nb-NO" smtClean="0"/>
+              <a:rPr lang="nb-NO"/>
               <a:t>Femte nivå</a:t>
             </a:r>
-            <a:endParaRPr lang="nb-NO"/>
           </a:p>
         </p:txBody>
       </p:sp>
@@ -2567,7 +2547,7 @@
           <a:p>
             <a:fld id="{68AFD362-A73F-9342-8E25-D2CF56234776}" type="datetimeFigureOut">
               <a:rPr lang="nb-NO" smtClean="0"/>
-              <a:t>30.06.2017</a:t>
+              <a:t>30.01.2018</a:t>
             </a:fld>
             <a:endParaRPr lang="nb-NO"/>
           </a:p>
@@ -3029,18 +3009,13 @@
           <a:lstStyle/>
           <a:p>
             <a:r>
-              <a:rPr lang="nb-NO" sz="2400" dirty="0" smtClean="0">
+              <a:rPr lang="nb-NO" sz="2400" dirty="0">
                 <a:solidFill>
                   <a:schemeClr val="accent1"/>
                 </a:solidFill>
               </a:rPr>
               <a:t>h</a:t>
             </a:r>
-            <a:endParaRPr lang="nb-NO" sz="2400" dirty="0">
-              <a:solidFill>
-                <a:schemeClr val="accent1"/>
-              </a:solidFill>
-            </a:endParaRPr>
           </a:p>
         </p:txBody>
       </p:sp>
@@ -3150,14 +3125,13 @@
           <a:lstStyle/>
           <a:p>
             <a:r>
-              <a:rPr lang="nb-NO" sz="2400" dirty="0" smtClean="0"/>
+              <a:rPr lang="nb-NO" sz="2400" dirty="0"/>
               <a:t>P</a:t>
             </a:r>
             <a:r>
-              <a:rPr lang="nb-NO" sz="2400" baseline="-25000" dirty="0" smtClean="0"/>
+              <a:rPr lang="nb-NO" sz="2400" baseline="-25000" dirty="0"/>
               <a:t>1</a:t>
             </a:r>
-            <a:endParaRPr lang="nb-NO" sz="2400" baseline="-25000" dirty="0"/>
           </a:p>
         </p:txBody>
       </p:sp>
@@ -3184,7 +3158,7 @@
           <a:lstStyle/>
           <a:p>
             <a:r>
-              <a:rPr lang="nb-NO" sz="2400" dirty="0" smtClean="0">
+              <a:rPr lang="nb-NO" sz="2400" dirty="0">
                 <a:solidFill>
                   <a:schemeClr val="bg1"/>
                 </a:solidFill>
@@ -3199,11 +3173,6 @@
               </a:rPr>
               <a:t>2</a:t>
             </a:r>
-            <a:endParaRPr lang="nb-NO" sz="2400" baseline="-25000" dirty="0">
-              <a:solidFill>
-                <a:schemeClr val="bg1"/>
-              </a:solidFill>
-            </a:endParaRPr>
           </a:p>
         </p:txBody>
       </p:sp>
@@ -3230,7 +3199,7 @@
           <a:lstStyle/>
           <a:p>
             <a:r>
-              <a:rPr lang="nb-NO" sz="2400" dirty="0" err="1" smtClean="0">
+              <a:rPr lang="nb-NO" sz="2400" dirty="0" err="1">
                 <a:solidFill>
                   <a:schemeClr val="bg1"/>
                 </a:solidFill>
@@ -3346,18 +3315,13 @@
             <a:lstStyle/>
             <a:p>
               <a:r>
-                <a:rPr lang="nb-NO" sz="2400" dirty="0" smtClean="0">
+                <a:rPr lang="nb-NO" sz="2400" dirty="0">
                   <a:solidFill>
                     <a:schemeClr val="accent1"/>
                   </a:solidFill>
                 </a:rPr>
                 <a:t>h</a:t>
               </a:r>
-              <a:endParaRPr lang="nb-NO" sz="2400" dirty="0">
-                <a:solidFill>
-                  <a:schemeClr val="accent1"/>
-                </a:solidFill>
-              </a:endParaRPr>
             </a:p>
           </p:txBody>
         </p:sp>
@@ -3384,7 +3348,7 @@
             <a:lstStyle/>
             <a:p>
               <a:r>
-                <a:rPr lang="nb-NO" sz="2400" dirty="0" err="1" smtClean="0">
+                <a:rPr lang="nb-NO" sz="2400" dirty="0" err="1">
                   <a:solidFill>
                     <a:schemeClr val="accent1"/>
                   </a:solidFill>
@@ -3392,7 +3356,7 @@
                 <a:t>q</a:t>
               </a:r>
               <a:r>
-                <a:rPr lang="nb-NO" sz="2400" baseline="-25000" dirty="0" err="1" smtClean="0">
+                <a:rPr lang="nb-NO" sz="2400" baseline="-25000" dirty="0" err="1">
                   <a:solidFill>
                     <a:schemeClr val="accent1"/>
                   </a:solidFill>
@@ -3560,7 +3524,7 @@
             <a:lstStyle/>
             <a:p>
               <a:r>
-                <a:rPr lang="nb-NO" sz="2400" dirty="0" smtClean="0">
+                <a:rPr lang="nb-NO" sz="2400" dirty="0">
                   <a:solidFill>
                     <a:schemeClr val="bg1"/>
                   </a:solidFill>
@@ -3568,18 +3532,13 @@
                 <a:t>A</a:t>
               </a:r>
               <a:r>
-                <a:rPr lang="nb-NO" sz="2400" baseline="-25000" dirty="0" smtClean="0">
+                <a:rPr lang="nb-NO" sz="2400" baseline="-25000" dirty="0">
                   <a:solidFill>
                     <a:schemeClr val="bg1"/>
                   </a:solidFill>
                 </a:rPr>
                 <a:t>t</a:t>
               </a:r>
-              <a:endParaRPr lang="nb-NO" sz="2400" baseline="-25000" dirty="0">
-                <a:solidFill>
-                  <a:schemeClr val="bg1"/>
-                </a:solidFill>
-              </a:endParaRPr>
             </a:p>
           </p:txBody>
         </p:sp>
@@ -3639,7 +3598,7 @@
             <a:lstStyle/>
             <a:p>
               <a:r>
-                <a:rPr lang="nb-NO" sz="2400" dirty="0" smtClean="0">
+                <a:rPr lang="nb-NO" sz="2400" dirty="0">
                   <a:solidFill>
                     <a:schemeClr val="bg1"/>
                   </a:solidFill>
@@ -3647,18 +3606,13 @@
                 <a:t>A</a:t>
               </a:r>
               <a:r>
-                <a:rPr lang="nb-NO" sz="2400" baseline="-25000" dirty="0" smtClean="0">
+                <a:rPr lang="nb-NO" sz="2400" baseline="-25000" dirty="0">
                   <a:solidFill>
                     <a:schemeClr val="bg1"/>
                   </a:solidFill>
                 </a:rPr>
                 <a:t>h</a:t>
               </a:r>
-              <a:endParaRPr lang="nb-NO" sz="2400" baseline="-25000" dirty="0">
-                <a:solidFill>
-                  <a:schemeClr val="bg1"/>
-                </a:solidFill>
-              </a:endParaRPr>
             </a:p>
           </p:txBody>
         </p:sp>
@@ -3764,18 +3718,13 @@
             <a:lstStyle/>
             <a:p>
               <a:r>
-                <a:rPr lang="nb-NO" sz="2400" dirty="0" smtClean="0">
+                <a:rPr lang="nb-NO" sz="2400" dirty="0">
                   <a:solidFill>
                     <a:schemeClr val="accent1"/>
                   </a:solidFill>
                 </a:rPr>
                 <a:t>h</a:t>
               </a:r>
-              <a:endParaRPr lang="nb-NO" sz="2400" dirty="0">
-                <a:solidFill>
-                  <a:schemeClr val="accent1"/>
-                </a:solidFill>
-              </a:endParaRPr>
             </a:p>
           </p:txBody>
         </p:sp>
@@ -3802,7 +3751,7 @@
             <a:lstStyle/>
             <a:p>
               <a:r>
-                <a:rPr lang="nb-NO" sz="2400" dirty="0" err="1" smtClean="0">
+                <a:rPr lang="nb-NO" sz="2400" dirty="0" err="1">
                   <a:solidFill>
                     <a:schemeClr val="accent1"/>
                   </a:solidFill>
@@ -3810,7 +3759,7 @@
                 <a:t>q</a:t>
               </a:r>
               <a:r>
-                <a:rPr lang="nb-NO" sz="2400" baseline="-25000" dirty="0" err="1" smtClean="0">
+                <a:rPr lang="nb-NO" sz="2400" baseline="-25000" dirty="0" err="1">
                   <a:solidFill>
                     <a:schemeClr val="accent1"/>
                   </a:solidFill>
@@ -3978,7 +3927,7 @@
             <a:lstStyle/>
             <a:p>
               <a:r>
-                <a:rPr lang="nb-NO" sz="2400" dirty="0" smtClean="0">
+                <a:rPr lang="nb-NO" sz="2400" dirty="0">
                   <a:solidFill>
                     <a:schemeClr val="bg1"/>
                   </a:solidFill>
@@ -3986,18 +3935,13 @@
                 <a:t>A</a:t>
               </a:r>
               <a:r>
-                <a:rPr lang="nb-NO" sz="2400" baseline="-25000" dirty="0" smtClean="0">
+                <a:rPr lang="nb-NO" sz="2400" baseline="-25000" dirty="0">
                   <a:solidFill>
                     <a:schemeClr val="bg1"/>
                   </a:solidFill>
                 </a:rPr>
                 <a:t>t</a:t>
               </a:r>
-              <a:endParaRPr lang="nb-NO" sz="2400" baseline="-25000" dirty="0">
-                <a:solidFill>
-                  <a:schemeClr val="bg1"/>
-                </a:solidFill>
-              </a:endParaRPr>
             </a:p>
           </p:txBody>
         </p:sp>
@@ -4057,7 +4001,7 @@
             <a:lstStyle/>
             <a:p>
               <a:r>
-                <a:rPr lang="nb-NO" sz="2400" dirty="0" err="1" smtClean="0">
+                <a:rPr lang="nb-NO" sz="2400" dirty="0" err="1">
                   <a:solidFill>
                     <a:schemeClr val="accent1"/>
                   </a:solidFill>
@@ -4065,7 +4009,7 @@
                 <a:t>q</a:t>
               </a:r>
               <a:r>
-                <a:rPr lang="nb-NO" sz="2400" baseline="-25000" dirty="0" err="1" smtClean="0">
+                <a:rPr lang="nb-NO" sz="2400" baseline="-25000" dirty="0" err="1">
                   <a:solidFill>
                     <a:schemeClr val="accent1"/>
                   </a:solidFill>
@@ -4136,7 +4080,7 @@
             <a:lstStyle/>
             <a:p>
               <a:r>
-                <a:rPr lang="nb-NO" sz="2400" dirty="0" smtClean="0">
+                <a:rPr lang="nb-NO" sz="2400" dirty="0">
                   <a:solidFill>
                     <a:schemeClr val="bg1"/>
                   </a:solidFill>
@@ -4144,18 +4088,13 @@
                 <a:t>A</a:t>
               </a:r>
               <a:r>
-                <a:rPr lang="nb-NO" sz="2400" baseline="-25000" dirty="0" smtClean="0">
+                <a:rPr lang="nb-NO" sz="2400" baseline="-25000" dirty="0">
                   <a:solidFill>
                     <a:schemeClr val="bg1"/>
                   </a:solidFill>
                 </a:rPr>
                 <a:t>h</a:t>
               </a:r>
-              <a:endParaRPr lang="nb-NO" sz="2400" baseline="-25000" dirty="0">
-                <a:solidFill>
-                  <a:schemeClr val="bg1"/>
-                </a:solidFill>
-              </a:endParaRPr>
             </a:p>
           </p:txBody>
         </p:sp>
@@ -4261,7 +4200,7 @@
             <a:lstStyle/>
             <a:p>
               <a:r>
-                <a:rPr lang="nb-NO" sz="2400" dirty="0" smtClean="0">
+                <a:rPr lang="nb-NO" sz="2400" dirty="0">
                   <a:solidFill>
                     <a:schemeClr val="accent1"/>
                   </a:solidFill>
@@ -4269,18 +4208,13 @@
                 <a:t>h</a:t>
               </a:r>
               <a:r>
-                <a:rPr lang="nb-NO" sz="2400" baseline="-25000" dirty="0" smtClean="0">
+                <a:rPr lang="nb-NO" sz="2400" baseline="-25000" dirty="0">
                   <a:solidFill>
                     <a:schemeClr val="accent1"/>
                   </a:solidFill>
                 </a:rPr>
                 <a:t>1</a:t>
               </a:r>
-              <a:endParaRPr lang="nb-NO" sz="2400" baseline="-25000" dirty="0">
-                <a:solidFill>
-                  <a:schemeClr val="accent1"/>
-                </a:solidFill>
-              </a:endParaRPr>
             </a:p>
           </p:txBody>
         </p:sp>
@@ -4307,7 +4241,7 @@
             <a:lstStyle/>
             <a:p>
               <a:r>
-                <a:rPr lang="nb-NO" sz="2400" dirty="0" smtClean="0">
+                <a:rPr lang="nb-NO" sz="2400" dirty="0">
                   <a:solidFill>
                     <a:schemeClr val="accent1"/>
                   </a:solidFill>
@@ -4315,18 +4249,13 @@
                 <a:t>q</a:t>
               </a:r>
               <a:r>
-                <a:rPr lang="nb-NO" sz="2400" baseline="-25000" dirty="0" smtClean="0">
+                <a:rPr lang="nb-NO" sz="2400" baseline="-25000" dirty="0">
                   <a:solidFill>
                     <a:schemeClr val="accent1"/>
                   </a:solidFill>
                 </a:rPr>
                 <a:t>ut1</a:t>
               </a:r>
-              <a:endParaRPr lang="nb-NO" sz="2400" baseline="-25000" dirty="0">
-                <a:solidFill>
-                  <a:schemeClr val="accent1"/>
-                </a:solidFill>
-              </a:endParaRPr>
             </a:p>
           </p:txBody>
         </p:sp>
@@ -4483,7 +4412,7 @@
             <a:lstStyle/>
             <a:p>
               <a:r>
-                <a:rPr lang="nb-NO" sz="2400" dirty="0" smtClean="0">
+                <a:rPr lang="nb-NO" sz="2400" dirty="0">
                   <a:solidFill>
                     <a:schemeClr val="bg1"/>
                   </a:solidFill>
@@ -4491,18 +4420,13 @@
                 <a:t>A</a:t>
               </a:r>
               <a:r>
-                <a:rPr lang="nb-NO" sz="2400" baseline="-25000" dirty="0" smtClean="0">
+                <a:rPr lang="nb-NO" sz="2400" baseline="-25000" dirty="0">
                   <a:solidFill>
                     <a:schemeClr val="bg1"/>
                   </a:solidFill>
                 </a:rPr>
                 <a:t>t1</a:t>
               </a:r>
-              <a:endParaRPr lang="nb-NO" sz="2400" baseline="-25000" dirty="0">
-                <a:solidFill>
-                  <a:schemeClr val="bg1"/>
-                </a:solidFill>
-              </a:endParaRPr>
             </a:p>
           </p:txBody>
         </p:sp>
@@ -4562,7 +4486,7 @@
             <a:lstStyle/>
             <a:p>
               <a:r>
-                <a:rPr lang="nb-NO" sz="2400" dirty="0" smtClean="0">
+                <a:rPr lang="nb-NO" sz="2400" dirty="0">
                   <a:solidFill>
                     <a:schemeClr val="accent1"/>
                   </a:solidFill>
@@ -4570,18 +4494,13 @@
                 <a:t>q</a:t>
               </a:r>
               <a:r>
-                <a:rPr lang="nb-NO" sz="2400" baseline="-25000" dirty="0" smtClean="0">
+                <a:rPr lang="nb-NO" sz="2400" baseline="-25000" dirty="0">
                   <a:solidFill>
                     <a:schemeClr val="accent1"/>
                   </a:solidFill>
                 </a:rPr>
                 <a:t>inn1</a:t>
               </a:r>
-              <a:endParaRPr lang="nb-NO" sz="2400" baseline="-25000" dirty="0">
-                <a:solidFill>
-                  <a:schemeClr val="accent1"/>
-                </a:solidFill>
-              </a:endParaRPr>
             </a:p>
           </p:txBody>
         </p:sp>
@@ -4675,7 +4594,7 @@
             <a:lstStyle/>
             <a:p>
               <a:r>
-                <a:rPr lang="nb-NO" sz="2400" dirty="0" smtClean="0">
+                <a:rPr lang="nb-NO" sz="2400" dirty="0">
                   <a:solidFill>
                     <a:schemeClr val="accent1"/>
                   </a:solidFill>
@@ -4683,18 +4602,13 @@
                 <a:t>h</a:t>
               </a:r>
               <a:r>
-                <a:rPr lang="nb-NO" sz="2400" baseline="-25000" dirty="0" smtClean="0">
+                <a:rPr lang="nb-NO" sz="2400" baseline="-25000" dirty="0">
                   <a:solidFill>
                     <a:schemeClr val="accent1"/>
                   </a:solidFill>
                 </a:rPr>
                 <a:t>2</a:t>
               </a:r>
-              <a:endParaRPr lang="nb-NO" sz="2400" baseline="-25000" dirty="0">
-                <a:solidFill>
-                  <a:schemeClr val="accent1"/>
-                </a:solidFill>
-              </a:endParaRPr>
             </a:p>
           </p:txBody>
         </p:sp>
@@ -4721,7 +4635,7 @@
             <a:lstStyle/>
             <a:p>
               <a:r>
-                <a:rPr lang="nb-NO" sz="2400" dirty="0" smtClean="0">
+                <a:rPr lang="nb-NO" sz="2400" dirty="0">
                   <a:solidFill>
                     <a:schemeClr val="accent1"/>
                   </a:solidFill>
@@ -4729,18 +4643,13 @@
                 <a:t>q</a:t>
               </a:r>
               <a:r>
-                <a:rPr lang="nb-NO" sz="2400" baseline="-25000" dirty="0" smtClean="0">
+                <a:rPr lang="nb-NO" sz="2400" baseline="-25000" dirty="0">
                   <a:solidFill>
                     <a:schemeClr val="accent1"/>
                   </a:solidFill>
                 </a:rPr>
                 <a:t>ut2</a:t>
               </a:r>
-              <a:endParaRPr lang="nb-NO" sz="2400" baseline="-25000" dirty="0">
-                <a:solidFill>
-                  <a:schemeClr val="accent1"/>
-                </a:solidFill>
-              </a:endParaRPr>
             </a:p>
           </p:txBody>
         </p:sp>
@@ -4897,7 +4806,7 @@
             <a:lstStyle/>
             <a:p>
               <a:r>
-                <a:rPr lang="nb-NO" sz="2400" dirty="0" smtClean="0">
+                <a:rPr lang="nb-NO" sz="2400" dirty="0">
                   <a:solidFill>
                     <a:schemeClr val="bg1"/>
                   </a:solidFill>
@@ -4905,18 +4814,13 @@
                 <a:t>A</a:t>
               </a:r>
               <a:r>
-                <a:rPr lang="nb-NO" sz="2400" baseline="-25000" dirty="0" smtClean="0">
+                <a:rPr lang="nb-NO" sz="2400" baseline="-25000" dirty="0">
                   <a:solidFill>
                     <a:schemeClr val="bg1"/>
                   </a:solidFill>
                 </a:rPr>
                 <a:t>t2</a:t>
               </a:r>
-              <a:endParaRPr lang="nb-NO" sz="2400" baseline="-25000" dirty="0">
-                <a:solidFill>
-                  <a:schemeClr val="bg1"/>
-                </a:solidFill>
-              </a:endParaRPr>
             </a:p>
           </p:txBody>
         </p:sp>
@@ -5009,7 +4913,7 @@
             <a:lstStyle/>
             <a:p>
               <a:r>
-                <a:rPr lang="nb-NO" sz="2400" smtClean="0">
+                <a:rPr lang="nb-NO" sz="2400">
                   <a:solidFill>
                     <a:schemeClr val="bg1"/>
                   </a:solidFill>
@@ -5017,7 +4921,7 @@
                 <a:t>A</a:t>
               </a:r>
               <a:r>
-                <a:rPr lang="nb-NO" sz="2400" baseline="-25000" smtClean="0">
+                <a:rPr lang="nb-NO" sz="2400" baseline="-25000">
                   <a:solidFill>
                     <a:schemeClr val="bg1"/>
                   </a:solidFill>
@@ -5055,7 +4959,7 @@
             <a:lstStyle/>
             <a:p>
               <a:r>
-                <a:rPr lang="nb-NO" sz="2400" smtClean="0">
+                <a:rPr lang="nb-NO" sz="2400">
                   <a:solidFill>
                     <a:schemeClr val="bg1"/>
                   </a:solidFill>
@@ -5063,7 +4967,7 @@
                 <a:t>A</a:t>
               </a:r>
               <a:r>
-                <a:rPr lang="nb-NO" sz="2400" baseline="-25000" smtClean="0">
+                <a:rPr lang="nb-NO" sz="2400" baseline="-25000">
                   <a:solidFill>
                     <a:schemeClr val="bg1"/>
                   </a:solidFill>
@@ -5083,6 +4987,606 @@
     <p:extLst>
       <p:ext uri="{BB962C8B-B14F-4D97-AF65-F5344CB8AC3E}">
         <p14:creationId xmlns:p14="http://schemas.microsoft.com/office/powerpoint/2010/main" val="472403284"/>
+      </p:ext>
+    </p:extLst>
+  </p:cSld>
+  <p:clrMapOvr>
+    <a:masterClrMapping/>
+  </p:clrMapOvr>
+</p:sld>
+</file>
+
+<file path=ppt/slides/slide5.xml><?xml version="1.0" encoding="utf-8"?>
+<p:sld xmlns:a="http://schemas.openxmlformats.org/drawingml/2006/main" xmlns:r="http://schemas.openxmlformats.org/officeDocument/2006/relationships" xmlns:p="http://schemas.openxmlformats.org/presentationml/2006/main">
+  <p:cSld>
+    <p:spTree>
+      <p:nvGrpSpPr>
+        <p:cNvPr id="1" name=""/>
+        <p:cNvGrpSpPr/>
+        <p:nvPr/>
+      </p:nvGrpSpPr>
+      <p:grpSpPr>
+        <a:xfrm>
+          <a:off x="0" y="0"/>
+          <a:ext cx="0" cy="0"/>
+          <a:chOff x="0" y="0"/>
+          <a:chExt cx="0" cy="0"/>
+        </a:xfrm>
+      </p:grpSpPr>
+      <p:sp>
+        <p:nvSpPr>
+          <p:cNvPr id="16" name="Sylinder 15"/>
+          <p:cNvSpPr/>
+          <p:nvPr/>
+        </p:nvSpPr>
+        <p:spPr>
+          <a:xfrm>
+            <a:off x="5080000" y="1845733"/>
+            <a:ext cx="1794934" cy="2865987"/>
+          </a:xfrm>
+          <a:prstGeom prst="can">
+            <a:avLst/>
+          </a:prstGeom>
+          <a:solidFill>
+            <a:schemeClr val="bg2"/>
+          </a:solidFill>
+        </p:spPr>
+        <p:style>
+          <a:lnRef idx="2">
+            <a:schemeClr val="accent1">
+              <a:shade val="50000"/>
+            </a:schemeClr>
+          </a:lnRef>
+          <a:fillRef idx="1">
+            <a:schemeClr val="accent1"/>
+          </a:fillRef>
+          <a:effectRef idx="0">
+            <a:schemeClr val="accent1"/>
+          </a:effectRef>
+          <a:fontRef idx="minor">
+            <a:schemeClr val="lt1"/>
+          </a:fontRef>
+        </p:style>
+        <p:txBody>
+          <a:bodyPr rtlCol="0" anchor="ctr"/>
+          <a:lstStyle/>
+          <a:p>
+            <a:pPr algn="ctr"/>
+            <a:endParaRPr lang="nb-NO"/>
+          </a:p>
+        </p:txBody>
+      </p:sp>
+      <p:sp>
+        <p:nvSpPr>
+          <p:cNvPr id="17" name="Sylinder 16"/>
+          <p:cNvSpPr/>
+          <p:nvPr/>
+        </p:nvSpPr>
+        <p:spPr>
+          <a:xfrm>
+            <a:off x="5080003" y="2402562"/>
+            <a:ext cx="1794934" cy="2309161"/>
+          </a:xfrm>
+          <a:prstGeom prst="can">
+            <a:avLst/>
+          </a:prstGeom>
+        </p:spPr>
+        <p:style>
+          <a:lnRef idx="2">
+            <a:schemeClr val="accent1">
+              <a:shade val="50000"/>
+            </a:schemeClr>
+          </a:lnRef>
+          <a:fillRef idx="1">
+            <a:schemeClr val="accent1"/>
+          </a:fillRef>
+          <a:effectRef idx="0">
+            <a:schemeClr val="accent1"/>
+          </a:effectRef>
+          <a:fontRef idx="minor">
+            <a:schemeClr val="lt1"/>
+          </a:fontRef>
+        </p:style>
+        <p:txBody>
+          <a:bodyPr rtlCol="0" anchor="ctr"/>
+          <a:lstStyle/>
+          <a:p>
+            <a:pPr algn="ctr"/>
+            <a:endParaRPr lang="nb-NO"/>
+          </a:p>
+        </p:txBody>
+      </p:sp>
+      <p:cxnSp>
+        <p:nvCxnSpPr>
+          <p:cNvPr id="7" name="Rett pil 6"/>
+          <p:cNvCxnSpPr/>
+          <p:nvPr/>
+        </p:nvCxnSpPr>
+        <p:spPr>
+          <a:xfrm>
+            <a:off x="6667776" y="4518385"/>
+            <a:ext cx="681291" cy="0"/>
+          </a:xfrm>
+          <a:prstGeom prst="straightConnector1">
+            <a:avLst/>
+          </a:prstGeom>
+          <a:ln w="101600">
+            <a:tailEnd type="triangle"/>
+          </a:ln>
+        </p:spPr>
+        <p:style>
+          <a:lnRef idx="1">
+            <a:schemeClr val="accent1"/>
+          </a:lnRef>
+          <a:fillRef idx="0">
+            <a:schemeClr val="accent1"/>
+          </a:fillRef>
+          <a:effectRef idx="0">
+            <a:schemeClr val="accent1"/>
+          </a:effectRef>
+          <a:fontRef idx="minor">
+            <a:schemeClr val="tx1"/>
+          </a:fontRef>
+        </p:style>
+      </p:cxnSp>
+      <mc:AlternateContent xmlns:mc="http://schemas.openxmlformats.org/markup-compatibility/2006">
+        <mc:Choice xmlns:a14="http://schemas.microsoft.com/office/drawing/2010/main" Requires="a14">
+          <p:sp>
+            <p:nvSpPr>
+              <p:cNvPr id="3" name="TextBox 2">
+                <a:extLst>
+                  <a:ext uri="{FF2B5EF4-FFF2-40B4-BE49-F238E27FC236}">
+                    <a16:creationId xmlns:a16="http://schemas.microsoft.com/office/drawing/2014/main" id="{8A3FEC46-11D9-0A44-8565-EE31034C977F}"/>
+                  </a:ext>
+                </a:extLst>
+              </p:cNvPr>
+              <p:cNvSpPr txBox="1"/>
+              <p:nvPr/>
+            </p:nvSpPr>
+            <p:spPr>
+              <a:xfrm>
+                <a:off x="6883494" y="2370024"/>
+                <a:ext cx="1890518" cy="518604"/>
+              </a:xfrm>
+              <a:prstGeom prst="rect">
+                <a:avLst/>
+              </a:prstGeom>
+              <a:noFill/>
+            </p:spPr>
+            <p:txBody>
+              <a:bodyPr wrap="none" lIns="0" tIns="0" rIns="0" bIns="0" rtlCol="0">
+                <a:spAutoFit/>
+              </a:bodyPr>
+              <a:lstStyle/>
+              <a:p>
+                <a14:m>
+                  <m:oMathPara xmlns:m="http://schemas.openxmlformats.org/officeDocument/2006/math">
+                    <m:oMathParaPr>
+                      <m:jc m:val="centerGroup"/>
+                    </m:oMathParaPr>
+                    <m:oMath xmlns:m="http://schemas.openxmlformats.org/officeDocument/2006/math">
+                      <m:sSub>
+                        <m:sSubPr>
+                          <m:ctrlPr>
+                            <a:rPr lang="nb-NO" b="0" i="1" smtClean="0">
+                              <a:latin typeface="Cambria Math" panose="02040503050406030204" pitchFamily="18" charset="0"/>
+                            </a:rPr>
+                          </m:ctrlPr>
+                        </m:sSubPr>
+                        <m:e>
+                          <m:r>
+                            <a:rPr lang="nb-NO" b="0" i="1" smtClean="0">
+                              <a:latin typeface="Cambria Math" panose="02040503050406030204" pitchFamily="18" charset="0"/>
+                            </a:rPr>
+                            <m:t>𝑃</m:t>
+                          </m:r>
+                        </m:e>
+                        <m:sub>
+                          <m:r>
+                            <a:rPr lang="nb-NO" b="0" i="1" smtClean="0">
+                              <a:latin typeface="Cambria Math" panose="02040503050406030204" pitchFamily="18" charset="0"/>
+                            </a:rPr>
+                            <m:t>0</m:t>
+                          </m:r>
+                        </m:sub>
+                      </m:sSub>
+                      <m:r>
+                        <a:rPr lang="nb-NO" b="0" i="1" smtClean="0">
+                          <a:latin typeface="Cambria Math" panose="02040503050406030204" pitchFamily="18" charset="0"/>
+                        </a:rPr>
+                        <m:t>+</m:t>
+                      </m:r>
+                      <m:r>
+                        <a:rPr lang="nb-NO" b="0" i="1" smtClean="0">
+                          <a:latin typeface="Cambria Math" panose="02040503050406030204" pitchFamily="18" charset="0"/>
+                        </a:rPr>
+                        <m:t>𝜌</m:t>
+                      </m:r>
+                      <m:r>
+                        <a:rPr lang="nb-NO" b="0" i="1" smtClean="0">
+                          <a:latin typeface="Cambria Math" panose="02040503050406030204" pitchFamily="18" charset="0"/>
+                        </a:rPr>
+                        <m:t>𝑔</m:t>
+                      </m:r>
+                      <m:sSub>
+                        <m:sSubPr>
+                          <m:ctrlPr>
+                            <a:rPr lang="nb-NO" b="0" i="1" smtClean="0">
+                              <a:latin typeface="Cambria Math" panose="02040503050406030204" pitchFamily="18" charset="0"/>
+                            </a:rPr>
+                          </m:ctrlPr>
+                        </m:sSubPr>
+                        <m:e>
+                          <m:r>
+                            <a:rPr lang="nb-NO" b="0" i="1" smtClean="0">
+                              <a:latin typeface="Cambria Math" panose="02040503050406030204" pitchFamily="18" charset="0"/>
+                            </a:rPr>
+                            <m:t>h</m:t>
+                          </m:r>
+                        </m:e>
+                        <m:sub>
+                          <m:r>
+                            <a:rPr lang="nb-NO" b="0" i="1" smtClean="0">
+                              <a:latin typeface="Cambria Math" panose="02040503050406030204" pitchFamily="18" charset="0"/>
+                            </a:rPr>
+                            <m:t>𝑜</m:t>
+                          </m:r>
+                        </m:sub>
+                      </m:sSub>
+                      <m:r>
+                        <a:rPr lang="nb-NO" b="0" i="1" smtClean="0">
+                          <a:latin typeface="Cambria Math" panose="02040503050406030204" pitchFamily="18" charset="0"/>
+                        </a:rPr>
+                        <m:t>+</m:t>
+                      </m:r>
+                      <m:f>
+                        <m:fPr>
+                          <m:ctrlPr>
+                            <a:rPr lang="nb-NO" b="0" i="1" smtClean="0">
+                              <a:latin typeface="Cambria Math" panose="02040503050406030204" pitchFamily="18" charset="0"/>
+                            </a:rPr>
+                          </m:ctrlPr>
+                        </m:fPr>
+                        <m:num>
+                          <m:r>
+                            <a:rPr lang="nb-NO" b="0" i="1" smtClean="0">
+                              <a:latin typeface="Cambria Math" panose="02040503050406030204" pitchFamily="18" charset="0"/>
+                            </a:rPr>
+                            <m:t>1</m:t>
+                          </m:r>
+                        </m:num>
+                        <m:den>
+                          <m:r>
+                            <a:rPr lang="nb-NO" b="0" i="1" smtClean="0">
+                              <a:latin typeface="Cambria Math" panose="02040503050406030204" pitchFamily="18" charset="0"/>
+                            </a:rPr>
+                            <m:t>2</m:t>
+                          </m:r>
+                        </m:den>
+                      </m:f>
+                      <m:r>
+                        <a:rPr lang="nb-NO" b="0" i="1" smtClean="0">
+                          <a:latin typeface="Cambria Math" panose="02040503050406030204" pitchFamily="18" charset="0"/>
+                        </a:rPr>
+                        <m:t>𝜌</m:t>
+                      </m:r>
+                      <m:sSubSup>
+                        <m:sSubSupPr>
+                          <m:ctrlPr>
+                            <a:rPr lang="nb-NO" b="0" i="1" smtClean="0">
+                              <a:latin typeface="Cambria Math" panose="02040503050406030204" pitchFamily="18" charset="0"/>
+                            </a:rPr>
+                          </m:ctrlPr>
+                        </m:sSubSupPr>
+                        <m:e>
+                          <m:r>
+                            <a:rPr lang="nb-NO" b="0" i="1" smtClean="0">
+                              <a:latin typeface="Cambria Math" panose="02040503050406030204" pitchFamily="18" charset="0"/>
+                            </a:rPr>
+                            <m:t>𝑣</m:t>
+                          </m:r>
+                        </m:e>
+                        <m:sub>
+                          <m:r>
+                            <a:rPr lang="nb-NO" b="0" i="1" smtClean="0">
+                              <a:latin typeface="Cambria Math" panose="02040503050406030204" pitchFamily="18" charset="0"/>
+                            </a:rPr>
+                            <m:t>0</m:t>
+                          </m:r>
+                        </m:sub>
+                        <m:sup>
+                          <m:r>
+                            <a:rPr lang="nb-NO" b="0" i="1" smtClean="0">
+                              <a:latin typeface="Cambria Math" panose="02040503050406030204" pitchFamily="18" charset="0"/>
+                            </a:rPr>
+                            <m:t>2</m:t>
+                          </m:r>
+                        </m:sup>
+                      </m:sSubSup>
+                    </m:oMath>
+                  </m:oMathPara>
+                </a14:m>
+                <a:endParaRPr lang="nb-NO" dirty="0"/>
+              </a:p>
+            </p:txBody>
+          </p:sp>
+        </mc:Choice>
+        <mc:Fallback>
+          <p:sp>
+            <p:nvSpPr>
+              <p:cNvPr id="3" name="TextBox 2">
+                <a:extLst>
+                  <a:ext uri="{FF2B5EF4-FFF2-40B4-BE49-F238E27FC236}">
+                    <a16:creationId xmlns:a16="http://schemas.microsoft.com/office/drawing/2014/main" id="{8A3FEC46-11D9-0A44-8565-EE31034C977F}"/>
+                  </a:ext>
+                </a:extLst>
+              </p:cNvPr>
+              <p:cNvSpPr txBox="1">
+                <a:spLocks noRot="1" noChangeAspect="1" noMove="1" noResize="1" noEditPoints="1" noAdjustHandles="1" noChangeArrowheads="1" noChangeShapeType="1" noTextEdit="1"/>
+              </p:cNvSpPr>
+              <p:nvPr/>
+            </p:nvSpPr>
+            <p:spPr>
+              <a:xfrm>
+                <a:off x="6883494" y="2370024"/>
+                <a:ext cx="1890518" cy="518604"/>
+              </a:xfrm>
+              <a:prstGeom prst="rect">
+                <a:avLst/>
+              </a:prstGeom>
+              <a:blipFill>
+                <a:blip r:embed="rId2"/>
+                <a:stretch>
+                  <a:fillRect l="-2000" t="-4878" b="-12195"/>
+                </a:stretch>
+              </a:blipFill>
+            </p:spPr>
+            <p:txBody>
+              <a:bodyPr/>
+              <a:lstStyle/>
+              <a:p>
+                <a:r>
+                  <a:rPr lang="nb-NO">
+                    <a:noFill/>
+                  </a:rPr>
+                  <a:t> </a:t>
+                </a:r>
+              </a:p>
+            </p:txBody>
+          </p:sp>
+        </mc:Fallback>
+      </mc:AlternateContent>
+      <mc:AlternateContent xmlns:mc="http://schemas.openxmlformats.org/markup-compatibility/2006">
+        <mc:Choice xmlns:a14="http://schemas.microsoft.com/office/drawing/2010/main" Requires="a14">
+          <p:sp>
+            <p:nvSpPr>
+              <p:cNvPr id="15" name="TextBox 14">
+                <a:extLst>
+                  <a:ext uri="{FF2B5EF4-FFF2-40B4-BE49-F238E27FC236}">
+                    <a16:creationId xmlns:a16="http://schemas.microsoft.com/office/drawing/2014/main" id="{21CCB6F3-8A15-EC4B-8B29-2DFD1FB65C06}"/>
+                  </a:ext>
+                </a:extLst>
+              </p:cNvPr>
+              <p:cNvSpPr txBox="1"/>
+              <p:nvPr/>
+            </p:nvSpPr>
+            <p:spPr>
+              <a:xfrm>
+                <a:off x="7364508" y="4222649"/>
+                <a:ext cx="1890518" cy="518604"/>
+              </a:xfrm>
+              <a:prstGeom prst="rect">
+                <a:avLst/>
+              </a:prstGeom>
+              <a:noFill/>
+            </p:spPr>
+            <p:txBody>
+              <a:bodyPr wrap="none" lIns="0" tIns="0" rIns="0" bIns="0" rtlCol="0">
+                <a:spAutoFit/>
+              </a:bodyPr>
+              <a:lstStyle/>
+              <a:p>
+                <a14:m>
+                  <m:oMathPara xmlns:m="http://schemas.openxmlformats.org/officeDocument/2006/math">
+                    <m:oMathParaPr>
+                      <m:jc m:val="centerGroup"/>
+                    </m:oMathParaPr>
+                    <m:oMath xmlns:m="http://schemas.openxmlformats.org/officeDocument/2006/math">
+                      <m:sSub>
+                        <m:sSubPr>
+                          <m:ctrlPr>
+                            <a:rPr lang="nb-NO" b="0" i="1" smtClean="0">
+                              <a:latin typeface="Cambria Math" panose="02040503050406030204" pitchFamily="18" charset="0"/>
+                            </a:rPr>
+                          </m:ctrlPr>
+                        </m:sSubPr>
+                        <m:e>
+                          <m:r>
+                            <a:rPr lang="nb-NO" b="0" i="1" smtClean="0">
+                              <a:latin typeface="Cambria Math" panose="02040503050406030204" pitchFamily="18" charset="0"/>
+                            </a:rPr>
+                            <m:t>𝑃</m:t>
+                          </m:r>
+                        </m:e>
+                        <m:sub>
+                          <m:r>
+                            <a:rPr lang="nb-NO" b="0" i="1" smtClean="0">
+                              <a:latin typeface="Cambria Math" panose="02040503050406030204" pitchFamily="18" charset="0"/>
+                            </a:rPr>
+                            <m:t>1</m:t>
+                          </m:r>
+                        </m:sub>
+                      </m:sSub>
+                      <m:r>
+                        <a:rPr lang="nb-NO" b="0" i="1" smtClean="0">
+                          <a:latin typeface="Cambria Math" panose="02040503050406030204" pitchFamily="18" charset="0"/>
+                        </a:rPr>
+                        <m:t>+</m:t>
+                      </m:r>
+                      <m:r>
+                        <a:rPr lang="nb-NO" b="0" i="1" smtClean="0">
+                          <a:latin typeface="Cambria Math" panose="02040503050406030204" pitchFamily="18" charset="0"/>
+                        </a:rPr>
+                        <m:t>𝜌</m:t>
+                      </m:r>
+                      <m:r>
+                        <a:rPr lang="nb-NO" b="0" i="1" smtClean="0">
+                          <a:latin typeface="Cambria Math" panose="02040503050406030204" pitchFamily="18" charset="0"/>
+                        </a:rPr>
+                        <m:t>𝑔</m:t>
+                      </m:r>
+                      <m:sSub>
+                        <m:sSubPr>
+                          <m:ctrlPr>
+                            <a:rPr lang="nb-NO" b="0" i="1" smtClean="0">
+                              <a:latin typeface="Cambria Math" panose="02040503050406030204" pitchFamily="18" charset="0"/>
+                            </a:rPr>
+                          </m:ctrlPr>
+                        </m:sSubPr>
+                        <m:e>
+                          <m:r>
+                            <a:rPr lang="nb-NO" b="0" i="1" smtClean="0">
+                              <a:latin typeface="Cambria Math" panose="02040503050406030204" pitchFamily="18" charset="0"/>
+                            </a:rPr>
+                            <m:t>h</m:t>
+                          </m:r>
+                        </m:e>
+                        <m:sub>
+                          <m:r>
+                            <a:rPr lang="nb-NO" b="0" i="1" smtClean="0">
+                              <a:latin typeface="Cambria Math" panose="02040503050406030204" pitchFamily="18" charset="0"/>
+                            </a:rPr>
+                            <m:t>1</m:t>
+                          </m:r>
+                        </m:sub>
+                      </m:sSub>
+                      <m:r>
+                        <a:rPr lang="nb-NO" b="0" i="1" smtClean="0">
+                          <a:latin typeface="Cambria Math" panose="02040503050406030204" pitchFamily="18" charset="0"/>
+                        </a:rPr>
+                        <m:t>+</m:t>
+                      </m:r>
+                      <m:f>
+                        <m:fPr>
+                          <m:ctrlPr>
+                            <a:rPr lang="nb-NO" b="0" i="1" smtClean="0">
+                              <a:latin typeface="Cambria Math" panose="02040503050406030204" pitchFamily="18" charset="0"/>
+                            </a:rPr>
+                          </m:ctrlPr>
+                        </m:fPr>
+                        <m:num>
+                          <m:r>
+                            <a:rPr lang="nb-NO" b="0" i="1" smtClean="0">
+                              <a:latin typeface="Cambria Math" panose="02040503050406030204" pitchFamily="18" charset="0"/>
+                            </a:rPr>
+                            <m:t>1</m:t>
+                          </m:r>
+                        </m:num>
+                        <m:den>
+                          <m:r>
+                            <a:rPr lang="nb-NO" b="0" i="1" smtClean="0">
+                              <a:latin typeface="Cambria Math" panose="02040503050406030204" pitchFamily="18" charset="0"/>
+                            </a:rPr>
+                            <m:t>2</m:t>
+                          </m:r>
+                        </m:den>
+                      </m:f>
+                      <m:r>
+                        <a:rPr lang="nb-NO" b="0" i="1" smtClean="0">
+                          <a:latin typeface="Cambria Math" panose="02040503050406030204" pitchFamily="18" charset="0"/>
+                        </a:rPr>
+                        <m:t>𝜌</m:t>
+                      </m:r>
+                      <m:sSubSup>
+                        <m:sSubSupPr>
+                          <m:ctrlPr>
+                            <a:rPr lang="nb-NO" b="0" i="1" smtClean="0">
+                              <a:latin typeface="Cambria Math" panose="02040503050406030204" pitchFamily="18" charset="0"/>
+                            </a:rPr>
+                          </m:ctrlPr>
+                        </m:sSubSupPr>
+                        <m:e>
+                          <m:r>
+                            <a:rPr lang="nb-NO" b="0" i="1" smtClean="0">
+                              <a:latin typeface="Cambria Math" panose="02040503050406030204" pitchFamily="18" charset="0"/>
+                            </a:rPr>
+                            <m:t>𝑣</m:t>
+                          </m:r>
+                        </m:e>
+                        <m:sub>
+                          <m:r>
+                            <a:rPr lang="nb-NO" b="0" i="1" smtClean="0">
+                              <a:latin typeface="Cambria Math" panose="02040503050406030204" pitchFamily="18" charset="0"/>
+                            </a:rPr>
+                            <m:t>1</m:t>
+                          </m:r>
+                        </m:sub>
+                        <m:sup>
+                          <m:r>
+                            <a:rPr lang="nb-NO" b="0" i="1" smtClean="0">
+                              <a:latin typeface="Cambria Math" panose="02040503050406030204" pitchFamily="18" charset="0"/>
+                            </a:rPr>
+                            <m:t>2</m:t>
+                          </m:r>
+                        </m:sup>
+                      </m:sSubSup>
+                    </m:oMath>
+                  </m:oMathPara>
+                </a14:m>
+                <a:endParaRPr lang="nb-NO" dirty="0"/>
+              </a:p>
+            </p:txBody>
+          </p:sp>
+        </mc:Choice>
+        <mc:Fallback>
+          <p:sp>
+            <p:nvSpPr>
+              <p:cNvPr id="15" name="TextBox 14">
+                <a:extLst>
+                  <a:ext uri="{FF2B5EF4-FFF2-40B4-BE49-F238E27FC236}">
+                    <a16:creationId xmlns:a16="http://schemas.microsoft.com/office/drawing/2014/main" id="{21CCB6F3-8A15-EC4B-8B29-2DFD1FB65C06}"/>
+                  </a:ext>
+                </a:extLst>
+              </p:cNvPr>
+              <p:cNvSpPr txBox="1">
+                <a:spLocks noRot="1" noChangeAspect="1" noMove="1" noResize="1" noEditPoints="1" noAdjustHandles="1" noChangeArrowheads="1" noChangeShapeType="1" noTextEdit="1"/>
+              </p:cNvSpPr>
+              <p:nvPr/>
+            </p:nvSpPr>
+            <p:spPr>
+              <a:xfrm>
+                <a:off x="7364508" y="4222649"/>
+                <a:ext cx="1890518" cy="518604"/>
+              </a:xfrm>
+              <a:prstGeom prst="rect">
+                <a:avLst/>
+              </a:prstGeom>
+              <a:blipFill>
+                <a:blip r:embed="rId3"/>
+                <a:stretch>
+                  <a:fillRect l="-2000" t="-2381" b="-11905"/>
+                </a:stretch>
+              </a:blipFill>
+            </p:spPr>
+            <p:txBody>
+              <a:bodyPr/>
+              <a:lstStyle/>
+              <a:p>
+                <a:r>
+                  <a:rPr lang="nb-NO">
+                    <a:noFill/>
+                  </a:rPr>
+                  <a:t> </a:t>
+                </a:r>
+              </a:p>
+            </p:txBody>
+          </p:sp>
+        </mc:Fallback>
+      </mc:AlternateContent>
+    </p:spTree>
+    <p:extLst>
+      <p:ext uri="{BB962C8B-B14F-4D97-AF65-F5344CB8AC3E}">
+        <p14:creationId xmlns:p14="http://schemas.microsoft.com/office/powerpoint/2010/main" val="762799781"/>
       </p:ext>
     </p:extLst>
   </p:cSld>

</xml_diff>